<commit_message>
Texturen überarbeitet und Kodierung vereinheitlicht
fix #33
</commit_message>
<xml_diff>
--- a/printer_textures.pptx
+++ b/printer_textures.pptx
@@ -275,7 +275,7 @@
           <a:p>
             <a:fld id="{7762483B-4454-443C-9D4B-2799C4AD7BD1}" type="datetimeFigureOut">
               <a:rPr lang="en-US" smtClean="0"/>
-              <a:t>11/12/2024</a:t>
+              <a:t>11/19/2024</a:t>
             </a:fld>
             <a:endParaRPr lang="en-US"/>
           </a:p>
@@ -445,7 +445,7 @@
           <a:p>
             <a:fld id="{7762483B-4454-443C-9D4B-2799C4AD7BD1}" type="datetimeFigureOut">
               <a:rPr lang="en-US" smtClean="0"/>
-              <a:t>11/12/2024</a:t>
+              <a:t>11/19/2024</a:t>
             </a:fld>
             <a:endParaRPr lang="en-US"/>
           </a:p>
@@ -625,7 +625,7 @@
           <a:p>
             <a:fld id="{7762483B-4454-443C-9D4B-2799C4AD7BD1}" type="datetimeFigureOut">
               <a:rPr lang="en-US" smtClean="0"/>
-              <a:t>11/12/2024</a:t>
+              <a:t>11/19/2024</a:t>
             </a:fld>
             <a:endParaRPr lang="en-US"/>
           </a:p>
@@ -795,7 +795,7 @@
           <a:p>
             <a:fld id="{7762483B-4454-443C-9D4B-2799C4AD7BD1}" type="datetimeFigureOut">
               <a:rPr lang="en-US" smtClean="0"/>
-              <a:t>11/12/2024</a:t>
+              <a:t>11/19/2024</a:t>
             </a:fld>
             <a:endParaRPr lang="en-US"/>
           </a:p>
@@ -1039,7 +1039,7 @@
           <a:p>
             <a:fld id="{7762483B-4454-443C-9D4B-2799C4AD7BD1}" type="datetimeFigureOut">
               <a:rPr lang="en-US" smtClean="0"/>
-              <a:t>11/12/2024</a:t>
+              <a:t>11/19/2024</a:t>
             </a:fld>
             <a:endParaRPr lang="en-US"/>
           </a:p>
@@ -1271,7 +1271,7 @@
           <a:p>
             <a:fld id="{7762483B-4454-443C-9D4B-2799C4AD7BD1}" type="datetimeFigureOut">
               <a:rPr lang="en-US" smtClean="0"/>
-              <a:t>11/12/2024</a:t>
+              <a:t>11/19/2024</a:t>
             </a:fld>
             <a:endParaRPr lang="en-US"/>
           </a:p>
@@ -1638,7 +1638,7 @@
           <a:p>
             <a:fld id="{7762483B-4454-443C-9D4B-2799C4AD7BD1}" type="datetimeFigureOut">
               <a:rPr lang="en-US" smtClean="0"/>
-              <a:t>11/12/2024</a:t>
+              <a:t>11/19/2024</a:t>
             </a:fld>
             <a:endParaRPr lang="en-US"/>
           </a:p>
@@ -1756,7 +1756,7 @@
           <a:p>
             <a:fld id="{7762483B-4454-443C-9D4B-2799C4AD7BD1}" type="datetimeFigureOut">
               <a:rPr lang="en-US" smtClean="0"/>
-              <a:t>11/12/2024</a:t>
+              <a:t>11/19/2024</a:t>
             </a:fld>
             <a:endParaRPr lang="en-US"/>
           </a:p>
@@ -1851,7 +1851,7 @@
           <a:p>
             <a:fld id="{7762483B-4454-443C-9D4B-2799C4AD7BD1}" type="datetimeFigureOut">
               <a:rPr lang="en-US" smtClean="0"/>
-              <a:t>11/12/2024</a:t>
+              <a:t>11/19/2024</a:t>
             </a:fld>
             <a:endParaRPr lang="en-US"/>
           </a:p>
@@ -2128,7 +2128,7 @@
           <a:p>
             <a:fld id="{7762483B-4454-443C-9D4B-2799C4AD7BD1}" type="datetimeFigureOut">
               <a:rPr lang="en-US" smtClean="0"/>
-              <a:t>11/12/2024</a:t>
+              <a:t>11/19/2024</a:t>
             </a:fld>
             <a:endParaRPr lang="en-US"/>
           </a:p>
@@ -2385,7 +2385,7 @@
           <a:p>
             <a:fld id="{7762483B-4454-443C-9D4B-2799C4AD7BD1}" type="datetimeFigureOut">
               <a:rPr lang="en-US" smtClean="0"/>
-              <a:t>11/12/2024</a:t>
+              <a:t>11/19/2024</a:t>
             </a:fld>
             <a:endParaRPr lang="en-US"/>
           </a:p>
@@ -2598,7 +2598,7 @@
           <a:p>
             <a:fld id="{7762483B-4454-443C-9D4B-2799C4AD7BD1}" type="datetimeFigureOut">
               <a:rPr lang="en-US" smtClean="0"/>
-              <a:t>11/12/2024</a:t>
+              <a:t>11/19/2024</a:t>
             </a:fld>
             <a:endParaRPr lang="en-US"/>
           </a:p>
@@ -26844,7 +26844,7 @@
         <p:spPr>
           <a:xfrm>
             <a:off x="111748" y="3327238"/>
-            <a:ext cx="1462260" cy="369332"/>
+            <a:ext cx="1782860" cy="369332"/>
           </a:xfrm>
           <a:prstGeom prst="rect">
             <a:avLst/>
@@ -26859,7 +26859,7 @@
           <a:p>
             <a:r>
               <a:rPr lang="de-DE" dirty="0"/>
-              <a:t>Liniensuffix:</a:t>
+              <a:t>Sonderzeichen:</a:t>
             </a:r>
             <a:endParaRPr lang="en-US" dirty="0"/>
           </a:p>
@@ -28560,7 +28560,7 @@
         <p:spPr>
           <a:xfrm>
             <a:off x="111748" y="3327238"/>
-            <a:ext cx="1462260" cy="369332"/>
+            <a:ext cx="1835759" cy="369332"/>
           </a:xfrm>
           <a:prstGeom prst="rect">
             <a:avLst/>
@@ -28575,7 +28575,7 @@
           <a:p>
             <a:r>
               <a:rPr lang="de-DE" dirty="0"/>
-              <a:t>Liniensuffix:</a:t>
+              <a:t>Sonderzeichen :</a:t>
             </a:r>
             <a:endParaRPr lang="en-US" dirty="0"/>
           </a:p>
@@ -30326,7 +30326,7 @@
         <p:spPr>
           <a:xfrm>
             <a:off x="111748" y="3327238"/>
-            <a:ext cx="1552028" cy="369332"/>
+            <a:ext cx="1919115" cy="369332"/>
           </a:xfrm>
           <a:prstGeom prst="rect">
             <a:avLst/>
@@ -30341,7 +30341,7 @@
           <a:p>
             <a:r>
               <a:rPr lang="de-DE" b="1" dirty="0"/>
-              <a:t>Liniensuffix:</a:t>
+              <a:t>Sonderzeichen:</a:t>
             </a:r>
             <a:endParaRPr lang="en-US" b="1" dirty="0"/>
           </a:p>

</xml_diff>